<commit_message>
implementation of line breaks in placeholder
</commit_message>
<xml_diff>
--- a/mac-template.pptx
+++ b/mac-template.pptx
@@ -63,9 +63,9 @@
         </a:solidFill>
         <a:effectLst/>
         <a:uFillTx/>
-        <a:latin typeface="+mj-lt"/>
-        <a:ea typeface="+mj-ea"/>
-        <a:cs typeface="+mj-cs"/>
+        <a:latin typeface="+mn-lt"/>
+        <a:ea typeface="+mn-ea"/>
+        <a:cs typeface="+mn-cs"/>
         <a:sym typeface="Helvetica"/>
       </a:defRPr>
     </a:lvl1pPr>
@@ -93,9 +93,9 @@
         </a:solidFill>
         <a:effectLst/>
         <a:uFillTx/>
-        <a:latin typeface="+mj-lt"/>
-        <a:ea typeface="+mj-ea"/>
-        <a:cs typeface="+mj-cs"/>
+        <a:latin typeface="+mn-lt"/>
+        <a:ea typeface="+mn-ea"/>
+        <a:cs typeface="+mn-cs"/>
         <a:sym typeface="Helvetica"/>
       </a:defRPr>
     </a:lvl2pPr>
@@ -123,9 +123,9 @@
         </a:solidFill>
         <a:effectLst/>
         <a:uFillTx/>
-        <a:latin typeface="+mj-lt"/>
-        <a:ea typeface="+mj-ea"/>
-        <a:cs typeface="+mj-cs"/>
+        <a:latin typeface="+mn-lt"/>
+        <a:ea typeface="+mn-ea"/>
+        <a:cs typeface="+mn-cs"/>
         <a:sym typeface="Helvetica"/>
       </a:defRPr>
     </a:lvl3pPr>
@@ -153,9 +153,9 @@
         </a:solidFill>
         <a:effectLst/>
         <a:uFillTx/>
-        <a:latin typeface="+mj-lt"/>
-        <a:ea typeface="+mj-ea"/>
-        <a:cs typeface="+mj-cs"/>
+        <a:latin typeface="+mn-lt"/>
+        <a:ea typeface="+mn-ea"/>
+        <a:cs typeface="+mn-cs"/>
         <a:sym typeface="Helvetica"/>
       </a:defRPr>
     </a:lvl4pPr>
@@ -183,9 +183,9 @@
         </a:solidFill>
         <a:effectLst/>
         <a:uFillTx/>
-        <a:latin typeface="+mj-lt"/>
-        <a:ea typeface="+mj-ea"/>
-        <a:cs typeface="+mj-cs"/>
+        <a:latin typeface="+mn-lt"/>
+        <a:ea typeface="+mn-ea"/>
+        <a:cs typeface="+mn-cs"/>
         <a:sym typeface="Helvetica"/>
       </a:defRPr>
     </a:lvl5pPr>
@@ -213,9 +213,9 @@
         </a:solidFill>
         <a:effectLst/>
         <a:uFillTx/>
-        <a:latin typeface="+mj-lt"/>
-        <a:ea typeface="+mj-ea"/>
-        <a:cs typeface="+mj-cs"/>
+        <a:latin typeface="+mn-lt"/>
+        <a:ea typeface="+mn-ea"/>
+        <a:cs typeface="+mn-cs"/>
         <a:sym typeface="Helvetica"/>
       </a:defRPr>
     </a:lvl6pPr>
@@ -243,9 +243,9 @@
         </a:solidFill>
         <a:effectLst/>
         <a:uFillTx/>
-        <a:latin typeface="+mj-lt"/>
-        <a:ea typeface="+mj-ea"/>
-        <a:cs typeface="+mj-cs"/>
+        <a:latin typeface="+mn-lt"/>
+        <a:ea typeface="+mn-ea"/>
+        <a:cs typeface="+mn-cs"/>
         <a:sym typeface="Helvetica"/>
       </a:defRPr>
     </a:lvl7pPr>
@@ -273,9 +273,9 @@
         </a:solidFill>
         <a:effectLst/>
         <a:uFillTx/>
-        <a:latin typeface="+mj-lt"/>
-        <a:ea typeface="+mj-ea"/>
-        <a:cs typeface="+mj-cs"/>
+        <a:latin typeface="+mn-lt"/>
+        <a:ea typeface="+mn-ea"/>
+        <a:cs typeface="+mn-cs"/>
         <a:sym typeface="Helvetica"/>
       </a:defRPr>
     </a:lvl8pPr>
@@ -303,9 +303,9 @@
         </a:solidFill>
         <a:effectLst/>
         <a:uFillTx/>
-        <a:latin typeface="+mj-lt"/>
-        <a:ea typeface="+mj-ea"/>
-        <a:cs typeface="+mj-cs"/>
+        <a:latin typeface="+mn-lt"/>
+        <a:ea typeface="+mn-ea"/>
+        <a:cs typeface="+mn-cs"/>
         <a:sym typeface="Helvetica"/>
       </a:defRPr>
     </a:lvl9pPr>
@@ -393,9 +393,9 @@
         <a:spcPct val="117999"/>
       </a:lnSpc>
       <a:defRPr sz="2200">
-        <a:latin typeface="+mn-lt"/>
-        <a:ea typeface="+mn-ea"/>
-        <a:cs typeface="+mn-cs"/>
+        <a:latin typeface="+mj-lt"/>
+        <a:ea typeface="+mj-ea"/>
+        <a:cs typeface="+mj-cs"/>
         <a:sym typeface="Helvetica Neue"/>
       </a:defRPr>
     </a:lvl1pPr>
@@ -404,9 +404,9 @@
         <a:spcPct val="117999"/>
       </a:lnSpc>
       <a:defRPr sz="2200">
-        <a:latin typeface="+mn-lt"/>
-        <a:ea typeface="+mn-ea"/>
-        <a:cs typeface="+mn-cs"/>
+        <a:latin typeface="+mj-lt"/>
+        <a:ea typeface="+mj-ea"/>
+        <a:cs typeface="+mj-cs"/>
         <a:sym typeface="Helvetica Neue"/>
       </a:defRPr>
     </a:lvl2pPr>
@@ -415,9 +415,9 @@
         <a:spcPct val="117999"/>
       </a:lnSpc>
       <a:defRPr sz="2200">
-        <a:latin typeface="+mn-lt"/>
-        <a:ea typeface="+mn-ea"/>
-        <a:cs typeface="+mn-cs"/>
+        <a:latin typeface="+mj-lt"/>
+        <a:ea typeface="+mj-ea"/>
+        <a:cs typeface="+mj-cs"/>
         <a:sym typeface="Helvetica Neue"/>
       </a:defRPr>
     </a:lvl3pPr>
@@ -426,9 +426,9 @@
         <a:spcPct val="117999"/>
       </a:lnSpc>
       <a:defRPr sz="2200">
-        <a:latin typeface="+mn-lt"/>
-        <a:ea typeface="+mn-ea"/>
-        <a:cs typeface="+mn-cs"/>
+        <a:latin typeface="+mj-lt"/>
+        <a:ea typeface="+mj-ea"/>
+        <a:cs typeface="+mj-cs"/>
         <a:sym typeface="Helvetica Neue"/>
       </a:defRPr>
     </a:lvl4pPr>
@@ -437,9 +437,9 @@
         <a:spcPct val="117999"/>
       </a:lnSpc>
       <a:defRPr sz="2200">
-        <a:latin typeface="+mn-lt"/>
-        <a:ea typeface="+mn-ea"/>
-        <a:cs typeface="+mn-cs"/>
+        <a:latin typeface="+mj-lt"/>
+        <a:ea typeface="+mj-ea"/>
+        <a:cs typeface="+mj-cs"/>
         <a:sym typeface="Helvetica Neue"/>
       </a:defRPr>
     </a:lvl5pPr>
@@ -448,9 +448,9 @@
         <a:spcPct val="117999"/>
       </a:lnSpc>
       <a:defRPr sz="2200">
-        <a:latin typeface="+mn-lt"/>
-        <a:ea typeface="+mn-ea"/>
-        <a:cs typeface="+mn-cs"/>
+        <a:latin typeface="+mj-lt"/>
+        <a:ea typeface="+mj-ea"/>
+        <a:cs typeface="+mj-cs"/>
         <a:sym typeface="Helvetica Neue"/>
       </a:defRPr>
     </a:lvl6pPr>
@@ -459,9 +459,9 @@
         <a:spcPct val="117999"/>
       </a:lnSpc>
       <a:defRPr sz="2200">
-        <a:latin typeface="+mn-lt"/>
-        <a:ea typeface="+mn-ea"/>
-        <a:cs typeface="+mn-cs"/>
+        <a:latin typeface="+mj-lt"/>
+        <a:ea typeface="+mj-ea"/>
+        <a:cs typeface="+mj-cs"/>
         <a:sym typeface="Helvetica Neue"/>
       </a:defRPr>
     </a:lvl7pPr>
@@ -470,9 +470,9 @@
         <a:spcPct val="117999"/>
       </a:lnSpc>
       <a:defRPr sz="2200">
-        <a:latin typeface="+mn-lt"/>
-        <a:ea typeface="+mn-ea"/>
-        <a:cs typeface="+mn-cs"/>
+        <a:latin typeface="+mj-lt"/>
+        <a:ea typeface="+mj-ea"/>
+        <a:cs typeface="+mj-cs"/>
         <a:sym typeface="Helvetica Neue"/>
       </a:defRPr>
     </a:lvl8pPr>
@@ -481,9 +481,9 @@
         <a:spcPct val="117999"/>
       </a:lnSpc>
       <a:defRPr sz="2200">
-        <a:latin typeface="+mn-lt"/>
-        <a:ea typeface="+mn-ea"/>
-        <a:cs typeface="+mn-cs"/>
+        <a:latin typeface="+mj-lt"/>
+        <a:ea typeface="+mj-ea"/>
+        <a:cs typeface="+mj-cs"/>
         <a:sym typeface="Helvetica Neue"/>
       </a:defRPr>
     </a:lvl9pPr>
@@ -519,7 +519,7 @@
         <p:spPr>
           <a:xfrm>
             <a:off x="1201340" y="11859862"/>
-            <a:ext cx="21971005" cy="637000"/>
+            <a:ext cx="21971005" cy="637003"/>
           </a:xfrm>
           <a:prstGeom prst="rect">
             <a:avLst/>
@@ -1508,7 +1508,7 @@
         <p:spPr>
           <a:xfrm>
             <a:off x="2430022" y="10675453"/>
-            <a:ext cx="20200057" cy="637000"/>
+            <a:ext cx="20200057" cy="637003"/>
           </a:xfrm>
           <a:prstGeom prst="rect">
             <a:avLst/>
@@ -2017,7 +2017,7 @@
         <p:spPr>
           <a:xfrm>
             <a:off x="1207690" y="1106137"/>
-            <a:ext cx="21968621" cy="637000"/>
+            <a:ext cx="21968621" cy="637003"/>
           </a:xfrm>
           <a:prstGeom prst="rect">
             <a:avLst/>
@@ -2117,7 +2117,7 @@
         <p:spPr>
           <a:xfrm>
             <a:off x="1206500" y="11609909"/>
-            <a:ext cx="21971000" cy="1116973"/>
+            <a:ext cx="21971000" cy="1116976"/>
           </a:xfrm>
           <a:prstGeom prst="rect">
             <a:avLst/>
@@ -3577,9 +3577,9 @@
                 <a:spcPts val="0"/>
               </a:spcBef>
               <a:defRPr sz="1800">
-                <a:latin typeface="+mn-lt"/>
-                <a:ea typeface="+mn-ea"/>
-                <a:cs typeface="+mn-cs"/>
+                <a:latin typeface="+mj-lt"/>
+                <a:ea typeface="+mj-ea"/>
+                <a:cs typeface="+mj-cs"/>
                 <a:sym typeface="Helvetica Neue"/>
               </a:defRPr>
             </a:lvl1pPr>
@@ -3635,9 +3635,9 @@
             <a:srgbClr val="000000"/>
           </a:solidFill>
           <a:uFillTx/>
-          <a:latin typeface="+mn-lt"/>
-          <a:ea typeface="+mn-ea"/>
-          <a:cs typeface="+mn-cs"/>
+          <a:latin typeface="+mj-lt"/>
+          <a:ea typeface="+mj-ea"/>
+          <a:cs typeface="+mj-cs"/>
           <a:sym typeface="Helvetica Neue"/>
         </a:defRPr>
       </a:lvl1pPr>
@@ -3661,9 +3661,9 @@
             <a:srgbClr val="000000"/>
           </a:solidFill>
           <a:uFillTx/>
-          <a:latin typeface="+mn-lt"/>
-          <a:ea typeface="+mn-ea"/>
-          <a:cs typeface="+mn-cs"/>
+          <a:latin typeface="+mj-lt"/>
+          <a:ea typeface="+mj-ea"/>
+          <a:cs typeface="+mj-cs"/>
           <a:sym typeface="Helvetica Neue"/>
         </a:defRPr>
       </a:lvl2pPr>
@@ -3687,9 +3687,9 @@
             <a:srgbClr val="000000"/>
           </a:solidFill>
           <a:uFillTx/>
-          <a:latin typeface="+mn-lt"/>
-          <a:ea typeface="+mn-ea"/>
-          <a:cs typeface="+mn-cs"/>
+          <a:latin typeface="+mj-lt"/>
+          <a:ea typeface="+mj-ea"/>
+          <a:cs typeface="+mj-cs"/>
           <a:sym typeface="Helvetica Neue"/>
         </a:defRPr>
       </a:lvl3pPr>
@@ -3713,9 +3713,9 @@
             <a:srgbClr val="000000"/>
           </a:solidFill>
           <a:uFillTx/>
-          <a:latin typeface="+mn-lt"/>
-          <a:ea typeface="+mn-ea"/>
-          <a:cs typeface="+mn-cs"/>
+          <a:latin typeface="+mj-lt"/>
+          <a:ea typeface="+mj-ea"/>
+          <a:cs typeface="+mj-cs"/>
           <a:sym typeface="Helvetica Neue"/>
         </a:defRPr>
       </a:lvl4pPr>
@@ -3739,9 +3739,9 @@
             <a:srgbClr val="000000"/>
           </a:solidFill>
           <a:uFillTx/>
-          <a:latin typeface="+mn-lt"/>
-          <a:ea typeface="+mn-ea"/>
-          <a:cs typeface="+mn-cs"/>
+          <a:latin typeface="+mj-lt"/>
+          <a:ea typeface="+mj-ea"/>
+          <a:cs typeface="+mj-cs"/>
           <a:sym typeface="Helvetica Neue"/>
         </a:defRPr>
       </a:lvl5pPr>
@@ -3765,9 +3765,9 @@
             <a:srgbClr val="000000"/>
           </a:solidFill>
           <a:uFillTx/>
-          <a:latin typeface="+mn-lt"/>
-          <a:ea typeface="+mn-ea"/>
-          <a:cs typeface="+mn-cs"/>
+          <a:latin typeface="+mj-lt"/>
+          <a:ea typeface="+mj-ea"/>
+          <a:cs typeface="+mj-cs"/>
           <a:sym typeface="Helvetica Neue"/>
         </a:defRPr>
       </a:lvl6pPr>
@@ -3791,9 +3791,9 @@
             <a:srgbClr val="000000"/>
           </a:solidFill>
           <a:uFillTx/>
-          <a:latin typeface="+mn-lt"/>
-          <a:ea typeface="+mn-ea"/>
-          <a:cs typeface="+mn-cs"/>
+          <a:latin typeface="+mj-lt"/>
+          <a:ea typeface="+mj-ea"/>
+          <a:cs typeface="+mj-cs"/>
           <a:sym typeface="Helvetica Neue"/>
         </a:defRPr>
       </a:lvl7pPr>
@@ -3817,9 +3817,9 @@
             <a:srgbClr val="000000"/>
           </a:solidFill>
           <a:uFillTx/>
-          <a:latin typeface="+mn-lt"/>
-          <a:ea typeface="+mn-ea"/>
-          <a:cs typeface="+mn-cs"/>
+          <a:latin typeface="+mj-lt"/>
+          <a:ea typeface="+mj-ea"/>
+          <a:cs typeface="+mj-cs"/>
           <a:sym typeface="Helvetica Neue"/>
         </a:defRPr>
       </a:lvl8pPr>
@@ -3843,9 +3843,9 @@
             <a:srgbClr val="000000"/>
           </a:solidFill>
           <a:uFillTx/>
-          <a:latin typeface="+mn-lt"/>
-          <a:ea typeface="+mn-ea"/>
-          <a:cs typeface="+mn-cs"/>
+          <a:latin typeface="+mj-lt"/>
+          <a:ea typeface="+mj-ea"/>
+          <a:cs typeface="+mj-cs"/>
           <a:sym typeface="Helvetica Neue"/>
         </a:defRPr>
       </a:lvl9pPr>
@@ -3871,9 +3871,9 @@
             <a:srgbClr val="000000"/>
           </a:solidFill>
           <a:uFillTx/>
-          <a:latin typeface="+mn-lt"/>
-          <a:ea typeface="+mn-ea"/>
-          <a:cs typeface="+mn-cs"/>
+          <a:latin typeface="+mj-lt"/>
+          <a:ea typeface="+mj-ea"/>
+          <a:cs typeface="+mj-cs"/>
           <a:sym typeface="Helvetica Neue"/>
         </a:defRPr>
       </a:lvl1pPr>
@@ -3897,9 +3897,9 @@
             <a:srgbClr val="000000"/>
           </a:solidFill>
           <a:uFillTx/>
-          <a:latin typeface="+mn-lt"/>
-          <a:ea typeface="+mn-ea"/>
-          <a:cs typeface="+mn-cs"/>
+          <a:latin typeface="+mj-lt"/>
+          <a:ea typeface="+mj-ea"/>
+          <a:cs typeface="+mj-cs"/>
           <a:sym typeface="Helvetica Neue"/>
         </a:defRPr>
       </a:lvl2pPr>
@@ -3923,9 +3923,9 @@
             <a:srgbClr val="000000"/>
           </a:solidFill>
           <a:uFillTx/>
-          <a:latin typeface="+mn-lt"/>
-          <a:ea typeface="+mn-ea"/>
-          <a:cs typeface="+mn-cs"/>
+          <a:latin typeface="+mj-lt"/>
+          <a:ea typeface="+mj-ea"/>
+          <a:cs typeface="+mj-cs"/>
           <a:sym typeface="Helvetica Neue"/>
         </a:defRPr>
       </a:lvl3pPr>
@@ -3949,9 +3949,9 @@
             <a:srgbClr val="000000"/>
           </a:solidFill>
           <a:uFillTx/>
-          <a:latin typeface="+mn-lt"/>
-          <a:ea typeface="+mn-ea"/>
-          <a:cs typeface="+mn-cs"/>
+          <a:latin typeface="+mj-lt"/>
+          <a:ea typeface="+mj-ea"/>
+          <a:cs typeface="+mj-cs"/>
           <a:sym typeface="Helvetica Neue"/>
         </a:defRPr>
       </a:lvl4pPr>
@@ -3975,9 +3975,9 @@
             <a:srgbClr val="000000"/>
           </a:solidFill>
           <a:uFillTx/>
-          <a:latin typeface="+mn-lt"/>
-          <a:ea typeface="+mn-ea"/>
-          <a:cs typeface="+mn-cs"/>
+          <a:latin typeface="+mj-lt"/>
+          <a:ea typeface="+mj-ea"/>
+          <a:cs typeface="+mj-cs"/>
           <a:sym typeface="Helvetica Neue"/>
         </a:defRPr>
       </a:lvl5pPr>
@@ -4001,9 +4001,9 @@
             <a:srgbClr val="000000"/>
           </a:solidFill>
           <a:uFillTx/>
-          <a:latin typeface="+mn-lt"/>
-          <a:ea typeface="+mn-ea"/>
-          <a:cs typeface="+mn-cs"/>
+          <a:latin typeface="+mj-lt"/>
+          <a:ea typeface="+mj-ea"/>
+          <a:cs typeface="+mj-cs"/>
           <a:sym typeface="Helvetica Neue"/>
         </a:defRPr>
       </a:lvl6pPr>
@@ -4027,9 +4027,9 @@
             <a:srgbClr val="000000"/>
           </a:solidFill>
           <a:uFillTx/>
-          <a:latin typeface="+mn-lt"/>
-          <a:ea typeface="+mn-ea"/>
-          <a:cs typeface="+mn-cs"/>
+          <a:latin typeface="+mj-lt"/>
+          <a:ea typeface="+mj-ea"/>
+          <a:cs typeface="+mj-cs"/>
           <a:sym typeface="Helvetica Neue"/>
         </a:defRPr>
       </a:lvl7pPr>
@@ -4053,9 +4053,9 @@
             <a:srgbClr val="000000"/>
           </a:solidFill>
           <a:uFillTx/>
-          <a:latin typeface="+mn-lt"/>
-          <a:ea typeface="+mn-ea"/>
-          <a:cs typeface="+mn-cs"/>
+          <a:latin typeface="+mj-lt"/>
+          <a:ea typeface="+mj-ea"/>
+          <a:cs typeface="+mj-cs"/>
           <a:sym typeface="Helvetica Neue"/>
         </a:defRPr>
       </a:lvl8pPr>
@@ -4079,9 +4079,9 @@
             <a:srgbClr val="000000"/>
           </a:solidFill>
           <a:uFillTx/>
-          <a:latin typeface="+mn-lt"/>
-          <a:ea typeface="+mn-ea"/>
-          <a:cs typeface="+mn-cs"/>
+          <a:latin typeface="+mj-lt"/>
+          <a:ea typeface="+mj-ea"/>
+          <a:cs typeface="+mj-cs"/>
           <a:sym typeface="Helvetica Neue"/>
         </a:defRPr>
       </a:lvl9pPr>
@@ -4353,8 +4353,8 @@
         </p:nvSpPr>
         <p:spPr>
           <a:xfrm>
-            <a:off x="1158405" y="4275916"/>
-            <a:ext cx="9779001" cy="5882281"/>
+            <a:off x="821741" y="5227839"/>
+            <a:ext cx="5910696" cy="2261106"/>
           </a:xfrm>
           <a:prstGeom prst="rect">
             <a:avLst/>
@@ -4364,13 +4364,13 @@
           <a:bodyPr/>
           <a:lstStyle>
             <a:lvl1pPr>
-              <a:defRPr spc="-200"/>
+              <a:defRPr b="0" spc="-200" sz="7000"/>
             </a:lvl1pPr>
           </a:lstStyle>
           <a:p>
             <a:pPr/>
             <a:r>
-              <a:t>{{TITLE_PLACEHOLDER}}</a:t>
+              <a:t>{{NAME_PLACEHOLDER}}</a:t>
             </a:r>
           </a:p>
         </p:txBody>
@@ -4393,8 +4393,8 @@
         </p:blipFill>
         <p:spPr>
           <a:xfrm>
-            <a:off x="1215893" y="1552556"/>
-            <a:ext cx="7620001" cy="5080001"/>
+            <a:off x="855182" y="831135"/>
+            <a:ext cx="5910694" cy="3940463"/>
           </a:xfrm>
           <a:prstGeom prst="rect">
             <a:avLst/>
@@ -4404,6 +4404,136 @@
           </a:ln>
         </p:spPr>
       </p:pic>
+      <p:sp>
+        <p:nvSpPr>
+          <p:cNvPr id="173" name="$title"/>
+          <p:cNvSpPr txBox="1"/>
+          <p:nvPr/>
+        </p:nvSpPr>
+        <p:spPr>
+          <a:xfrm>
+            <a:off x="855181" y="7278626"/>
+            <a:ext cx="5910696" cy="2261106"/>
+          </a:xfrm>
+          <a:prstGeom prst="rect">
+            <a:avLst/>
+          </a:prstGeom>
+          <a:ln w="12700">
+            <a:miter lim="400000"/>
+          </a:ln>
+          <a:extLst>
+            <a:ext uri="{C572A759-6A51-4108-AA02-DFA0A04FC94B}">
+              <ma14:wrappingTextBoxFlag xmlns:ma14="http://schemas.microsoft.com/office/mac/drawingml/2011/main" val="1"/>
+            </a:ext>
+          </a:extLst>
+        </p:spPr>
+        <p:txBody>
+          <a:bodyPr lIns="50800" tIns="50800" rIns="50800" bIns="50800" anchor="b">
+            <a:normAutofit fontScale="100000" lnSpcReduction="0"/>
+          </a:bodyPr>
+          <a:lstStyle>
+            <a:lvl1pPr>
+              <a:lnSpc>
+                <a:spcPct val="80000"/>
+              </a:lnSpc>
+              <a:spcBef>
+                <a:spcPts val="0"/>
+              </a:spcBef>
+              <a:defRPr spc="-200" sz="7000">
+                <a:latin typeface="+mj-lt"/>
+                <a:ea typeface="+mj-ea"/>
+                <a:cs typeface="+mj-cs"/>
+                <a:sym typeface="Helvetica Neue"/>
+              </a:defRPr>
+            </a:lvl1pPr>
+          </a:lstStyle>
+          <a:p>
+            <a:pPr/>
+            <a:r>
+              <a:t>{{ROLE_PLACEHOLDER}}</a:t>
+            </a:r>
+          </a:p>
+        </p:txBody>
+      </p:sp>
+      <p:sp>
+        <p:nvSpPr>
+          <p:cNvPr id="174" name="Linien"/>
+          <p:cNvSpPr/>
+          <p:nvPr/>
+        </p:nvSpPr>
+        <p:spPr>
+          <a:xfrm flipV="1">
+            <a:off x="8430845" y="570605"/>
+            <a:ext cx="3" cy="12169344"/>
+          </a:xfrm>
+          <a:prstGeom prst="line">
+            <a:avLst/>
+          </a:prstGeom>
+          <a:ln w="25400">
+            <a:solidFill>
+              <a:schemeClr val="accent1"/>
+            </a:solidFill>
+          </a:ln>
+        </p:spPr>
+        <p:txBody>
+          <a:bodyPr lIns="45718" tIns="45718" rIns="45718" bIns="45718"/>
+          <a:lstStyle/>
+          <a:p>
+            <a:pPr/>
+          </a:p>
+        </p:txBody>
+      </p:sp>
+      <p:sp>
+        <p:nvSpPr>
+          <p:cNvPr id="175" name="$title"/>
+          <p:cNvSpPr txBox="1"/>
+          <p:nvPr/>
+        </p:nvSpPr>
+        <p:spPr>
+          <a:xfrm>
+            <a:off x="9236653" y="617512"/>
+            <a:ext cx="14037400" cy="12169344"/>
+          </a:xfrm>
+          <a:prstGeom prst="rect">
+            <a:avLst/>
+          </a:prstGeom>
+          <a:ln w="12700">
+            <a:miter lim="400000"/>
+          </a:ln>
+          <a:extLst>
+            <a:ext uri="{C572A759-6A51-4108-AA02-DFA0A04FC94B}">
+              <ma14:wrappingTextBoxFlag xmlns:ma14="http://schemas.microsoft.com/office/mac/drawingml/2011/main" val="1"/>
+            </a:ext>
+          </a:extLst>
+        </p:spPr>
+        <p:txBody>
+          <a:bodyPr lIns="50800" tIns="50800" rIns="50800" bIns="50800">
+            <a:normAutofit fontScale="100000" lnSpcReduction="0"/>
+          </a:bodyPr>
+          <a:lstStyle>
+            <a:lvl1pPr>
+              <a:lnSpc>
+                <a:spcPct val="80000"/>
+              </a:lnSpc>
+              <a:spcBef>
+                <a:spcPts val="0"/>
+              </a:spcBef>
+              <a:defRPr spc="-200" sz="7000">
+                <a:latin typeface="+mj-lt"/>
+                <a:ea typeface="+mj-ea"/>
+                <a:cs typeface="+mj-cs"/>
+                <a:sym typeface="Helvetica Neue"/>
+              </a:defRPr>
+            </a:lvl1pPr>
+          </a:lstStyle>
+          <a:p>
+            <a:pPr/>
+            <a:r>
+              <a:t>{{VITATEXT_PLACEHOLDER}}</a:t>
+            </a:r>
+          </a:p>
+        </p:txBody>
+      </p:sp>
     </p:spTree>
   </p:cSld>
   <p:clrMapOvr>
@@ -4456,14 +4586,14 @@
     </a:clrScheme>
     <a:fontScheme name="21_BasicWhite">
       <a:majorFont>
+        <a:latin typeface="Helvetica Neue"/>
+        <a:ea typeface="Helvetica Neue"/>
+        <a:cs typeface="Helvetica Neue"/>
+      </a:majorFont>
+      <a:minorFont>
         <a:latin typeface="Helvetica"/>
         <a:ea typeface="Helvetica"/>
         <a:cs typeface="Helvetica"/>
-      </a:majorFont>
-      <a:minorFont>
-        <a:latin typeface="Helvetica Neue"/>
-        <a:ea typeface="Helvetica Neue"/>
-        <a:cs typeface="Helvetica Neue"/>
       </a:minorFont>
     </a:fontScheme>
     <a:fmtScheme name="21_BasicWhite">
@@ -4644,9 +4774,9 @@
             </a:solidFill>
             <a:effectLst/>
             <a:uFillTx/>
-            <a:latin typeface="+mj-lt"/>
-            <a:ea typeface="+mj-ea"/>
-            <a:cs typeface="+mj-cs"/>
+            <a:latin typeface="+mn-lt"/>
+            <a:ea typeface="+mn-ea"/>
+            <a:cs typeface="+mn-cs"/>
             <a:sym typeface="Helvetica"/>
           </a:defRPr>
         </a:defPPr>
@@ -5215,9 +5345,9 @@
             </a:solidFill>
             <a:effectLst/>
             <a:uFillTx/>
-            <a:latin typeface="+mj-lt"/>
-            <a:ea typeface="+mj-ea"/>
-            <a:cs typeface="+mj-cs"/>
+            <a:latin typeface="+mn-lt"/>
+            <a:ea typeface="+mn-ea"/>
+            <a:cs typeface="+mn-cs"/>
             <a:sym typeface="Helvetica"/>
           </a:defRPr>
         </a:defPPr>
@@ -5510,14 +5640,14 @@
     </a:clrScheme>
     <a:fontScheme name="21_BasicWhite">
       <a:majorFont>
+        <a:latin typeface="Helvetica Neue"/>
+        <a:ea typeface="Helvetica Neue"/>
+        <a:cs typeface="Helvetica Neue"/>
+      </a:majorFont>
+      <a:minorFont>
         <a:latin typeface="Helvetica"/>
         <a:ea typeface="Helvetica"/>
         <a:cs typeface="Helvetica"/>
-      </a:majorFont>
-      <a:minorFont>
-        <a:latin typeface="Helvetica Neue"/>
-        <a:ea typeface="Helvetica Neue"/>
-        <a:cs typeface="Helvetica Neue"/>
       </a:minorFont>
     </a:fontScheme>
     <a:fmtScheme name="21_BasicWhite">
@@ -5698,9 +5828,9 @@
             </a:solidFill>
             <a:effectLst/>
             <a:uFillTx/>
-            <a:latin typeface="+mj-lt"/>
-            <a:ea typeface="+mj-ea"/>
-            <a:cs typeface="+mj-cs"/>
+            <a:latin typeface="+mn-lt"/>
+            <a:ea typeface="+mn-ea"/>
+            <a:cs typeface="+mn-cs"/>
             <a:sym typeface="Helvetica"/>
           </a:defRPr>
         </a:defPPr>
@@ -6269,9 +6399,9 @@
             </a:solidFill>
             <a:effectLst/>
             <a:uFillTx/>
-            <a:latin typeface="+mj-lt"/>
-            <a:ea typeface="+mj-ea"/>
-            <a:cs typeface="+mj-cs"/>
+            <a:latin typeface="+mn-lt"/>
+            <a:ea typeface="+mn-ea"/>
+            <a:cs typeface="+mn-cs"/>
             <a:sym typeface="Helvetica"/>
           </a:defRPr>
         </a:defPPr>

</xml_diff>